<commit_message>
Introduced new program for ESP32 S3 development board
Modified task creation to allow pinning to cores. Cyclic task runs on core 1, all other services on core 0
</commit_message>
<xml_diff>
--- a/Documents/Diagram.pptx
+++ b/Documents/Diagram.pptx
@@ -7,6 +7,7 @@
   <p:sldIdLst>
     <p:sldId id="256" r:id="rId2"/>
     <p:sldId id="257" r:id="rId3"/>
+    <p:sldId id="258" r:id="rId4"/>
   </p:sldIdLst>
   <p:sldSz cx="12192000" cy="6858000"/>
   <p:notesSz cx="6858000" cy="9144000"/>
@@ -262,7 +263,7 @@
           <a:p>
             <a:fld id="{F8DC1015-422A-4414-B370-40667003ACCC}" type="datetimeFigureOut">
               <a:rPr lang="en-GB" smtClean="0"/>
-              <a:t>29/01/2025</a:t>
+              <a:t>11/02/2025</a:t>
             </a:fld>
             <a:endParaRPr lang="en-GB"/>
           </a:p>
@@ -462,7 +463,7 @@
           <a:p>
             <a:fld id="{F8DC1015-422A-4414-B370-40667003ACCC}" type="datetimeFigureOut">
               <a:rPr lang="en-GB" smtClean="0"/>
-              <a:t>29/01/2025</a:t>
+              <a:t>11/02/2025</a:t>
             </a:fld>
             <a:endParaRPr lang="en-GB"/>
           </a:p>
@@ -672,7 +673,7 @@
           <a:p>
             <a:fld id="{F8DC1015-422A-4414-B370-40667003ACCC}" type="datetimeFigureOut">
               <a:rPr lang="en-GB" smtClean="0"/>
-              <a:t>29/01/2025</a:t>
+              <a:t>11/02/2025</a:t>
             </a:fld>
             <a:endParaRPr lang="en-GB"/>
           </a:p>
@@ -872,7 +873,7 @@
           <a:p>
             <a:fld id="{F8DC1015-422A-4414-B370-40667003ACCC}" type="datetimeFigureOut">
               <a:rPr lang="en-GB" smtClean="0"/>
-              <a:t>29/01/2025</a:t>
+              <a:t>11/02/2025</a:t>
             </a:fld>
             <a:endParaRPr lang="en-GB"/>
           </a:p>
@@ -1148,7 +1149,7 @@
           <a:p>
             <a:fld id="{F8DC1015-422A-4414-B370-40667003ACCC}" type="datetimeFigureOut">
               <a:rPr lang="en-GB" smtClean="0"/>
-              <a:t>29/01/2025</a:t>
+              <a:t>11/02/2025</a:t>
             </a:fld>
             <a:endParaRPr lang="en-GB"/>
           </a:p>
@@ -1416,7 +1417,7 @@
           <a:p>
             <a:fld id="{F8DC1015-422A-4414-B370-40667003ACCC}" type="datetimeFigureOut">
               <a:rPr lang="en-GB" smtClean="0"/>
-              <a:t>29/01/2025</a:t>
+              <a:t>11/02/2025</a:t>
             </a:fld>
             <a:endParaRPr lang="en-GB"/>
           </a:p>
@@ -1831,7 +1832,7 @@
           <a:p>
             <a:fld id="{F8DC1015-422A-4414-B370-40667003ACCC}" type="datetimeFigureOut">
               <a:rPr lang="en-GB" smtClean="0"/>
-              <a:t>29/01/2025</a:t>
+              <a:t>11/02/2025</a:t>
             </a:fld>
             <a:endParaRPr lang="en-GB"/>
           </a:p>
@@ -1973,7 +1974,7 @@
           <a:p>
             <a:fld id="{F8DC1015-422A-4414-B370-40667003ACCC}" type="datetimeFigureOut">
               <a:rPr lang="en-GB" smtClean="0"/>
-              <a:t>29/01/2025</a:t>
+              <a:t>11/02/2025</a:t>
             </a:fld>
             <a:endParaRPr lang="en-GB"/>
           </a:p>
@@ -2086,7 +2087,7 @@
           <a:p>
             <a:fld id="{F8DC1015-422A-4414-B370-40667003ACCC}" type="datetimeFigureOut">
               <a:rPr lang="en-GB" smtClean="0"/>
-              <a:t>29/01/2025</a:t>
+              <a:t>11/02/2025</a:t>
             </a:fld>
             <a:endParaRPr lang="en-GB"/>
           </a:p>
@@ -2399,7 +2400,7 @@
           <a:p>
             <a:fld id="{F8DC1015-422A-4414-B370-40667003ACCC}" type="datetimeFigureOut">
               <a:rPr lang="en-GB" smtClean="0"/>
-              <a:t>29/01/2025</a:t>
+              <a:t>11/02/2025</a:t>
             </a:fld>
             <a:endParaRPr lang="en-GB"/>
           </a:p>
@@ -2688,7 +2689,7 @@
           <a:p>
             <a:fld id="{F8DC1015-422A-4414-B370-40667003ACCC}" type="datetimeFigureOut">
               <a:rPr lang="en-GB" smtClean="0"/>
-              <a:t>29/01/2025</a:t>
+              <a:t>11/02/2025</a:t>
             </a:fld>
             <a:endParaRPr lang="en-GB"/>
           </a:p>
@@ -2931,7 +2932,7 @@
           <a:p>
             <a:fld id="{F8DC1015-422A-4414-B370-40667003ACCC}" type="datetimeFigureOut">
               <a:rPr lang="en-GB" smtClean="0"/>
-              <a:t>29/01/2025</a:t>
+              <a:t>11/02/2025</a:t>
             </a:fld>
             <a:endParaRPr lang="en-GB"/>
           </a:p>
@@ -5129,6 +5130,1045 @@
 </p:sld>
 </file>
 
+<file path=ppt/slides/slide3.xml><?xml version="1.0" encoding="utf-8"?>
+<p:sld xmlns:a="http://schemas.openxmlformats.org/drawingml/2006/main" xmlns:r="http://schemas.openxmlformats.org/officeDocument/2006/relationships" xmlns:p="http://schemas.openxmlformats.org/presentationml/2006/main">
+  <p:cSld>
+    <p:spTree>
+      <p:nvGrpSpPr>
+        <p:cNvPr id="1" name="">
+          <a:extLst>
+            <a:ext uri="{FF2B5EF4-FFF2-40B4-BE49-F238E27FC236}">
+              <a16:creationId xmlns:a16="http://schemas.microsoft.com/office/drawing/2014/main" id="{60BB8D9A-9FD9-B102-14E5-83275CAB0811}"/>
+            </a:ext>
+          </a:extLst>
+        </p:cNvPr>
+        <p:cNvGrpSpPr/>
+        <p:nvPr/>
+      </p:nvGrpSpPr>
+      <p:grpSpPr>
+        <a:xfrm>
+          <a:off x="0" y="0"/>
+          <a:ext cx="0" cy="0"/>
+          <a:chOff x="0" y="0"/>
+          <a:chExt cx="0" cy="0"/>
+        </a:xfrm>
+      </p:grpSpPr>
+      <p:grpSp>
+        <p:nvGrpSpPr>
+          <p:cNvPr id="40" name="Group 39">
+            <a:extLst>
+              <a:ext uri="{FF2B5EF4-FFF2-40B4-BE49-F238E27FC236}">
+                <a16:creationId xmlns:a16="http://schemas.microsoft.com/office/drawing/2014/main" id="{E19329DD-6674-DDE0-04C1-48951FDEA09F}"/>
+              </a:ext>
+            </a:extLst>
+          </p:cNvPr>
+          <p:cNvGrpSpPr/>
+          <p:nvPr/>
+        </p:nvGrpSpPr>
+        <p:grpSpPr>
+          <a:xfrm>
+            <a:off x="688073" y="257694"/>
+            <a:ext cx="4855648" cy="3912108"/>
+            <a:chOff x="379475" y="195072"/>
+            <a:chExt cx="4855648" cy="3912108"/>
+          </a:xfrm>
+        </p:grpSpPr>
+        <p:grpSp>
+          <p:nvGrpSpPr>
+            <p:cNvPr id="22" name="Group 21">
+              <a:extLst>
+                <a:ext uri="{FF2B5EF4-FFF2-40B4-BE49-F238E27FC236}">
+                  <a16:creationId xmlns:a16="http://schemas.microsoft.com/office/drawing/2014/main" id="{45CC4739-B309-B462-BC6A-31DC0E2E7B61}"/>
+                </a:ext>
+              </a:extLst>
+            </p:cNvPr>
+            <p:cNvGrpSpPr/>
+            <p:nvPr/>
+          </p:nvGrpSpPr>
+          <p:grpSpPr>
+            <a:xfrm>
+              <a:off x="379475" y="195072"/>
+              <a:ext cx="4855648" cy="3912108"/>
+              <a:chOff x="67055" y="195072"/>
+              <a:chExt cx="3822192" cy="2340864"/>
+            </a:xfrm>
+          </p:grpSpPr>
+          <p:sp>
+            <p:nvSpPr>
+              <p:cNvPr id="4" name="Rectangle: Rounded Corners 3">
+                <a:extLst>
+                  <a:ext uri="{FF2B5EF4-FFF2-40B4-BE49-F238E27FC236}">
+                    <a16:creationId xmlns:a16="http://schemas.microsoft.com/office/drawing/2014/main" id="{423C17CE-6DE9-A800-6210-3820FBF42EE3}"/>
+                  </a:ext>
+                </a:extLst>
+              </p:cNvPr>
+              <p:cNvSpPr/>
+              <p:nvPr/>
+            </p:nvSpPr>
+            <p:spPr>
+              <a:xfrm>
+                <a:off x="67055" y="195072"/>
+                <a:ext cx="3822192" cy="2340864"/>
+              </a:xfrm>
+              <a:prstGeom prst="roundRect">
+                <a:avLst>
+                  <a:gd name="adj" fmla="val 11992"/>
+                </a:avLst>
+              </a:prstGeom>
+              <a:solidFill>
+                <a:schemeClr val="accent6"/>
+              </a:solidFill>
+            </p:spPr>
+            <p:style>
+              <a:lnRef idx="2">
+                <a:schemeClr val="accent1">
+                  <a:shade val="15000"/>
+                </a:schemeClr>
+              </a:lnRef>
+              <a:fillRef idx="1">
+                <a:schemeClr val="accent1"/>
+              </a:fillRef>
+              <a:effectRef idx="0">
+                <a:schemeClr val="accent1"/>
+              </a:effectRef>
+              <a:fontRef idx="minor">
+                <a:schemeClr val="lt1"/>
+              </a:fontRef>
+            </p:style>
+            <p:txBody>
+              <a:bodyPr rtlCol="0" anchor="ctr"/>
+              <a:lstStyle/>
+              <a:p>
+                <a:pPr algn="ctr"/>
+                <a:endParaRPr lang="en-GB" dirty="0">
+                  <a:solidFill>
+                    <a:schemeClr val="accent6"/>
+                  </a:solidFill>
+                </a:endParaRPr>
+              </a:p>
+            </p:txBody>
+          </p:sp>
+          <p:sp>
+            <p:nvSpPr>
+              <p:cNvPr id="6" name="TextBox 5">
+                <a:extLst>
+                  <a:ext uri="{FF2B5EF4-FFF2-40B4-BE49-F238E27FC236}">
+                    <a16:creationId xmlns:a16="http://schemas.microsoft.com/office/drawing/2014/main" id="{995F052F-FD61-213A-16B6-B77D5908B875}"/>
+                  </a:ext>
+                </a:extLst>
+              </p:cNvPr>
+              <p:cNvSpPr txBox="1"/>
+              <p:nvPr/>
+            </p:nvSpPr>
+            <p:spPr>
+              <a:xfrm>
+                <a:off x="871727" y="232543"/>
+                <a:ext cx="2212848" cy="220995"/>
+              </a:xfrm>
+              <a:prstGeom prst="rect">
+                <a:avLst/>
+              </a:prstGeom>
+              <a:noFill/>
+            </p:spPr>
+            <p:txBody>
+              <a:bodyPr wrap="square" rtlCol="0">
+                <a:spAutoFit/>
+              </a:bodyPr>
+              <a:lstStyle/>
+              <a:p>
+                <a:pPr algn="ctr"/>
+                <a:r>
+                  <a:rPr lang="en-GB" dirty="0">
+                    <a:solidFill>
+                      <a:schemeClr val="bg1"/>
+                    </a:solidFill>
+                  </a:rPr>
+                  <a:t>Core 0</a:t>
+                </a:r>
+              </a:p>
+            </p:txBody>
+          </p:sp>
+        </p:grpSp>
+        <p:grpSp>
+          <p:nvGrpSpPr>
+            <p:cNvPr id="25" name="Group 24">
+              <a:extLst>
+                <a:ext uri="{FF2B5EF4-FFF2-40B4-BE49-F238E27FC236}">
+                  <a16:creationId xmlns:a16="http://schemas.microsoft.com/office/drawing/2014/main" id="{4A7B92ED-9CD5-2BE4-3758-AEAEB3925E41}"/>
+                </a:ext>
+              </a:extLst>
+            </p:cNvPr>
+            <p:cNvGrpSpPr/>
+            <p:nvPr/>
+          </p:nvGrpSpPr>
+          <p:grpSpPr>
+            <a:xfrm>
+              <a:off x="804854" y="601875"/>
+              <a:ext cx="500352" cy="3409906"/>
+              <a:chOff x="640259" y="384855"/>
+              <a:chExt cx="500352" cy="3409906"/>
+            </a:xfrm>
+          </p:grpSpPr>
+          <p:sp>
+            <p:nvSpPr>
+              <p:cNvPr id="23" name="Rectangle: Rounded Corners 22">
+                <a:extLst>
+                  <a:ext uri="{FF2B5EF4-FFF2-40B4-BE49-F238E27FC236}">
+                    <a16:creationId xmlns:a16="http://schemas.microsoft.com/office/drawing/2014/main" id="{74D41D34-E578-AFCF-131E-78F70C3A1199}"/>
+                  </a:ext>
+                </a:extLst>
+              </p:cNvPr>
+              <p:cNvSpPr/>
+              <p:nvPr/>
+            </p:nvSpPr>
+            <p:spPr>
+              <a:xfrm>
+                <a:off x="640259" y="384855"/>
+                <a:ext cx="432534" cy="3409906"/>
+              </a:xfrm>
+              <a:prstGeom prst="roundRect">
+                <a:avLst>
+                  <a:gd name="adj" fmla="val 41331"/>
+                </a:avLst>
+              </a:prstGeom>
+            </p:spPr>
+            <p:style>
+              <a:lnRef idx="2">
+                <a:schemeClr val="accent1">
+                  <a:shade val="15000"/>
+                </a:schemeClr>
+              </a:lnRef>
+              <a:fillRef idx="1">
+                <a:schemeClr val="accent1"/>
+              </a:fillRef>
+              <a:effectRef idx="0">
+                <a:schemeClr val="accent1"/>
+              </a:effectRef>
+              <a:fontRef idx="minor">
+                <a:schemeClr val="lt1"/>
+              </a:fontRef>
+            </p:style>
+            <p:txBody>
+              <a:bodyPr rtlCol="0" anchor="ctr"/>
+              <a:lstStyle/>
+              <a:p>
+                <a:pPr algn="ctr"/>
+                <a:endParaRPr lang="en-GB"/>
+              </a:p>
+            </p:txBody>
+          </p:sp>
+          <p:sp>
+            <p:nvSpPr>
+              <p:cNvPr id="24" name="TextBox 23">
+                <a:extLst>
+                  <a:ext uri="{FF2B5EF4-FFF2-40B4-BE49-F238E27FC236}">
+                    <a16:creationId xmlns:a16="http://schemas.microsoft.com/office/drawing/2014/main" id="{55C91510-83AC-6F2C-959C-B3C511B96E55}"/>
+                  </a:ext>
+                </a:extLst>
+              </p:cNvPr>
+              <p:cNvSpPr txBox="1"/>
+              <p:nvPr/>
+            </p:nvSpPr>
+            <p:spPr>
+              <a:xfrm>
+                <a:off x="708077" y="417209"/>
+                <a:ext cx="432534" cy="3139321"/>
+              </a:xfrm>
+              <a:prstGeom prst="rect">
+                <a:avLst/>
+              </a:prstGeom>
+              <a:noFill/>
+            </p:spPr>
+            <p:txBody>
+              <a:bodyPr wrap="square" rtlCol="0">
+                <a:spAutoFit/>
+              </a:bodyPr>
+              <a:lstStyle/>
+              <a:p>
+                <a:r>
+                  <a:rPr lang="en-GB" dirty="0">
+                    <a:solidFill>
+                      <a:schemeClr val="bg1"/>
+                    </a:solidFill>
+                  </a:rPr>
+                  <a:t>1</a:t>
+                </a:r>
+              </a:p>
+              <a:p>
+                <a:endParaRPr lang="en-GB" dirty="0">
+                  <a:solidFill>
+                    <a:schemeClr val="bg1"/>
+                  </a:solidFill>
+                </a:endParaRPr>
+              </a:p>
+              <a:p>
+                <a:r>
+                  <a:rPr lang="en-GB" dirty="0">
+                    <a:solidFill>
+                      <a:schemeClr val="bg1"/>
+                    </a:solidFill>
+                  </a:rPr>
+                  <a:t>2</a:t>
+                </a:r>
+              </a:p>
+              <a:p>
+                <a:endParaRPr lang="en-GB" dirty="0">
+                  <a:solidFill>
+                    <a:schemeClr val="bg1"/>
+                  </a:solidFill>
+                </a:endParaRPr>
+              </a:p>
+              <a:p>
+                <a:r>
+                  <a:rPr lang="en-GB" dirty="0">
+                    <a:solidFill>
+                      <a:schemeClr val="bg1"/>
+                    </a:solidFill>
+                  </a:rPr>
+                  <a:t>3</a:t>
+                </a:r>
+              </a:p>
+              <a:p>
+                <a:endParaRPr lang="en-GB" dirty="0">
+                  <a:solidFill>
+                    <a:schemeClr val="bg1"/>
+                  </a:solidFill>
+                </a:endParaRPr>
+              </a:p>
+              <a:p>
+                <a:r>
+                  <a:rPr lang="en-GB" dirty="0">
+                    <a:solidFill>
+                      <a:schemeClr val="bg1"/>
+                    </a:solidFill>
+                  </a:rPr>
+                  <a:t>4</a:t>
+                </a:r>
+              </a:p>
+              <a:p>
+                <a:endParaRPr lang="en-GB" dirty="0">
+                  <a:solidFill>
+                    <a:schemeClr val="bg1"/>
+                  </a:solidFill>
+                </a:endParaRPr>
+              </a:p>
+              <a:p>
+                <a:r>
+                  <a:rPr lang="en-GB" dirty="0">
+                    <a:solidFill>
+                      <a:schemeClr val="bg1"/>
+                    </a:solidFill>
+                  </a:rPr>
+                  <a:t>5</a:t>
+                </a:r>
+              </a:p>
+              <a:p>
+                <a:endParaRPr lang="en-GB" dirty="0">
+                  <a:solidFill>
+                    <a:schemeClr val="bg1"/>
+                  </a:solidFill>
+                </a:endParaRPr>
+              </a:p>
+              <a:p>
+                <a:r>
+                  <a:rPr lang="en-GB" dirty="0">
+                    <a:solidFill>
+                      <a:schemeClr val="bg1"/>
+                    </a:solidFill>
+                  </a:rPr>
+                  <a:t>6</a:t>
+                </a:r>
+              </a:p>
+            </p:txBody>
+          </p:sp>
+        </p:grpSp>
+        <p:sp>
+          <p:nvSpPr>
+            <p:cNvPr id="26" name="Rectangle: Rounded Corners 25">
+              <a:extLst>
+                <a:ext uri="{FF2B5EF4-FFF2-40B4-BE49-F238E27FC236}">
+                  <a16:creationId xmlns:a16="http://schemas.microsoft.com/office/drawing/2014/main" id="{9B324752-A5BC-4E4D-44E1-54B8DF9A7457}"/>
+                </a:ext>
+              </a:extLst>
+            </p:cNvPr>
+            <p:cNvSpPr/>
+            <p:nvPr/>
+          </p:nvSpPr>
+          <p:spPr>
+            <a:xfrm>
+              <a:off x="1491894" y="679381"/>
+              <a:ext cx="2371446" cy="291471"/>
+            </a:xfrm>
+            <a:prstGeom prst="roundRect">
+              <a:avLst/>
+            </a:prstGeom>
+          </p:spPr>
+          <p:style>
+            <a:lnRef idx="2">
+              <a:schemeClr val="accent1">
+                <a:shade val="15000"/>
+              </a:schemeClr>
+            </a:lnRef>
+            <a:fillRef idx="1">
+              <a:schemeClr val="accent1"/>
+            </a:fillRef>
+            <a:effectRef idx="0">
+              <a:schemeClr val="accent1"/>
+            </a:effectRef>
+            <a:fontRef idx="minor">
+              <a:schemeClr val="lt1"/>
+            </a:fontRef>
+          </p:style>
+          <p:txBody>
+            <a:bodyPr rtlCol="0" anchor="ctr"/>
+            <a:lstStyle/>
+            <a:p>
+              <a:pPr algn="ctr"/>
+              <a:r>
+                <a:rPr lang="en-GB" dirty="0"/>
+                <a:t>ESP Now Task</a:t>
+              </a:r>
+            </a:p>
+          </p:txBody>
+        </p:sp>
+        <p:sp>
+          <p:nvSpPr>
+            <p:cNvPr id="27" name="Rectangle: Rounded Corners 26">
+              <a:extLst>
+                <a:ext uri="{FF2B5EF4-FFF2-40B4-BE49-F238E27FC236}">
+                  <a16:creationId xmlns:a16="http://schemas.microsoft.com/office/drawing/2014/main" id="{D7A8AE30-2343-6AE8-D6C4-54A437C83DC8}"/>
+                </a:ext>
+              </a:extLst>
+            </p:cNvPr>
+            <p:cNvSpPr/>
+            <p:nvPr/>
+          </p:nvSpPr>
+          <p:spPr>
+            <a:xfrm>
+              <a:off x="1491894" y="1243848"/>
+              <a:ext cx="2371446" cy="291471"/>
+            </a:xfrm>
+            <a:prstGeom prst="roundRect">
+              <a:avLst/>
+            </a:prstGeom>
+          </p:spPr>
+          <p:style>
+            <a:lnRef idx="2">
+              <a:schemeClr val="accent1">
+                <a:shade val="15000"/>
+              </a:schemeClr>
+            </a:lnRef>
+            <a:fillRef idx="1">
+              <a:schemeClr val="accent1"/>
+            </a:fillRef>
+            <a:effectRef idx="0">
+              <a:schemeClr val="accent1"/>
+            </a:effectRef>
+            <a:fontRef idx="minor">
+              <a:schemeClr val="lt1"/>
+            </a:fontRef>
+          </p:style>
+          <p:txBody>
+            <a:bodyPr rtlCol="0" anchor="ctr"/>
+            <a:lstStyle/>
+            <a:p>
+              <a:pPr algn="ctr"/>
+              <a:r>
+                <a:rPr lang="en-GB" dirty="0"/>
+                <a:t>UDP Processing Task</a:t>
+              </a:r>
+            </a:p>
+          </p:txBody>
+        </p:sp>
+      </p:grpSp>
+      <p:grpSp>
+        <p:nvGrpSpPr>
+          <p:cNvPr id="2" name="Group 1">
+            <a:extLst>
+              <a:ext uri="{FF2B5EF4-FFF2-40B4-BE49-F238E27FC236}">
+                <a16:creationId xmlns:a16="http://schemas.microsoft.com/office/drawing/2014/main" id="{2E89C76E-BB70-64BF-B0DE-428686575C3E}"/>
+              </a:ext>
+            </a:extLst>
+          </p:cNvPr>
+          <p:cNvGrpSpPr/>
+          <p:nvPr/>
+        </p:nvGrpSpPr>
+        <p:grpSpPr>
+          <a:xfrm>
+            <a:off x="6565963" y="257694"/>
+            <a:ext cx="4855648" cy="3912108"/>
+            <a:chOff x="379475" y="195072"/>
+            <a:chExt cx="4855648" cy="3912108"/>
+          </a:xfrm>
+        </p:grpSpPr>
+        <p:grpSp>
+          <p:nvGrpSpPr>
+            <p:cNvPr id="3" name="Group 2">
+              <a:extLst>
+                <a:ext uri="{FF2B5EF4-FFF2-40B4-BE49-F238E27FC236}">
+                  <a16:creationId xmlns:a16="http://schemas.microsoft.com/office/drawing/2014/main" id="{5539F8B7-8388-1C04-417F-C84E88B487FF}"/>
+                </a:ext>
+              </a:extLst>
+            </p:cNvPr>
+            <p:cNvGrpSpPr/>
+            <p:nvPr/>
+          </p:nvGrpSpPr>
+          <p:grpSpPr>
+            <a:xfrm>
+              <a:off x="379475" y="195072"/>
+              <a:ext cx="4855648" cy="3912108"/>
+              <a:chOff x="67055" y="195072"/>
+              <a:chExt cx="3822192" cy="2340864"/>
+            </a:xfrm>
+          </p:grpSpPr>
+          <p:sp>
+            <p:nvSpPr>
+              <p:cNvPr id="15" name="Rectangle: Rounded Corners 14">
+                <a:extLst>
+                  <a:ext uri="{FF2B5EF4-FFF2-40B4-BE49-F238E27FC236}">
+                    <a16:creationId xmlns:a16="http://schemas.microsoft.com/office/drawing/2014/main" id="{6BB7BEFA-FA6C-9A8E-97E4-DE5EB212E872}"/>
+                  </a:ext>
+                </a:extLst>
+              </p:cNvPr>
+              <p:cNvSpPr/>
+              <p:nvPr/>
+            </p:nvSpPr>
+            <p:spPr>
+              <a:xfrm>
+                <a:off x="67055" y="195072"/>
+                <a:ext cx="3822192" cy="2340864"/>
+              </a:xfrm>
+              <a:prstGeom prst="roundRect">
+                <a:avLst>
+                  <a:gd name="adj" fmla="val 11992"/>
+                </a:avLst>
+              </a:prstGeom>
+              <a:solidFill>
+                <a:schemeClr val="accent6"/>
+              </a:solidFill>
+            </p:spPr>
+            <p:style>
+              <a:lnRef idx="2">
+                <a:schemeClr val="accent1">
+                  <a:shade val="15000"/>
+                </a:schemeClr>
+              </a:lnRef>
+              <a:fillRef idx="1">
+                <a:schemeClr val="accent1"/>
+              </a:fillRef>
+              <a:effectRef idx="0">
+                <a:schemeClr val="accent1"/>
+              </a:effectRef>
+              <a:fontRef idx="minor">
+                <a:schemeClr val="lt1"/>
+              </a:fontRef>
+            </p:style>
+            <p:txBody>
+              <a:bodyPr rtlCol="0" anchor="ctr"/>
+              <a:lstStyle/>
+              <a:p>
+                <a:pPr algn="ctr"/>
+                <a:endParaRPr lang="en-GB" dirty="0">
+                  <a:solidFill>
+                    <a:schemeClr val="accent6"/>
+                  </a:solidFill>
+                </a:endParaRPr>
+              </a:p>
+            </p:txBody>
+          </p:sp>
+          <p:sp>
+            <p:nvSpPr>
+              <p:cNvPr id="16" name="TextBox 15">
+                <a:extLst>
+                  <a:ext uri="{FF2B5EF4-FFF2-40B4-BE49-F238E27FC236}">
+                    <a16:creationId xmlns:a16="http://schemas.microsoft.com/office/drawing/2014/main" id="{FC820F0D-BED8-E385-BC04-BA193B9FD034}"/>
+                  </a:ext>
+                </a:extLst>
+              </p:cNvPr>
+              <p:cNvSpPr txBox="1"/>
+              <p:nvPr/>
+            </p:nvSpPr>
+            <p:spPr>
+              <a:xfrm>
+                <a:off x="871727" y="232543"/>
+                <a:ext cx="2212848" cy="220995"/>
+              </a:xfrm>
+              <a:prstGeom prst="rect">
+                <a:avLst/>
+              </a:prstGeom>
+              <a:noFill/>
+            </p:spPr>
+            <p:txBody>
+              <a:bodyPr wrap="square" rtlCol="0">
+                <a:spAutoFit/>
+              </a:bodyPr>
+              <a:lstStyle/>
+              <a:p>
+                <a:pPr algn="ctr"/>
+                <a:r>
+                  <a:rPr lang="en-GB" dirty="0">
+                    <a:solidFill>
+                      <a:schemeClr val="bg1"/>
+                    </a:solidFill>
+                  </a:rPr>
+                  <a:t>Core 1</a:t>
+                </a:r>
+              </a:p>
+            </p:txBody>
+          </p:sp>
+        </p:grpSp>
+        <p:grpSp>
+          <p:nvGrpSpPr>
+            <p:cNvPr id="7" name="Group 6">
+              <a:extLst>
+                <a:ext uri="{FF2B5EF4-FFF2-40B4-BE49-F238E27FC236}">
+                  <a16:creationId xmlns:a16="http://schemas.microsoft.com/office/drawing/2014/main" id="{61E43299-590D-9F88-8EBE-424FEEC25B4E}"/>
+                </a:ext>
+              </a:extLst>
+            </p:cNvPr>
+            <p:cNvGrpSpPr/>
+            <p:nvPr/>
+          </p:nvGrpSpPr>
+          <p:grpSpPr>
+            <a:xfrm>
+              <a:off x="804854" y="601875"/>
+              <a:ext cx="500352" cy="3409906"/>
+              <a:chOff x="640259" y="384855"/>
+              <a:chExt cx="500352" cy="3409906"/>
+            </a:xfrm>
+          </p:grpSpPr>
+          <p:sp>
+            <p:nvSpPr>
+              <p:cNvPr id="13" name="Rectangle: Rounded Corners 12">
+                <a:extLst>
+                  <a:ext uri="{FF2B5EF4-FFF2-40B4-BE49-F238E27FC236}">
+                    <a16:creationId xmlns:a16="http://schemas.microsoft.com/office/drawing/2014/main" id="{91ADD104-346C-82EB-45DF-9A848B1EA1D4}"/>
+                  </a:ext>
+                </a:extLst>
+              </p:cNvPr>
+              <p:cNvSpPr/>
+              <p:nvPr/>
+            </p:nvSpPr>
+            <p:spPr>
+              <a:xfrm>
+                <a:off x="640259" y="384855"/>
+                <a:ext cx="432534" cy="3409906"/>
+              </a:xfrm>
+              <a:prstGeom prst="roundRect">
+                <a:avLst>
+                  <a:gd name="adj" fmla="val 41331"/>
+                </a:avLst>
+              </a:prstGeom>
+            </p:spPr>
+            <p:style>
+              <a:lnRef idx="2">
+                <a:schemeClr val="accent1">
+                  <a:shade val="15000"/>
+                </a:schemeClr>
+              </a:lnRef>
+              <a:fillRef idx="1">
+                <a:schemeClr val="accent1"/>
+              </a:fillRef>
+              <a:effectRef idx="0">
+                <a:schemeClr val="accent1"/>
+              </a:effectRef>
+              <a:fontRef idx="minor">
+                <a:schemeClr val="lt1"/>
+              </a:fontRef>
+            </p:style>
+            <p:txBody>
+              <a:bodyPr rtlCol="0" anchor="ctr"/>
+              <a:lstStyle/>
+              <a:p>
+                <a:pPr algn="ctr"/>
+                <a:endParaRPr lang="en-GB"/>
+              </a:p>
+            </p:txBody>
+          </p:sp>
+          <p:sp>
+            <p:nvSpPr>
+              <p:cNvPr id="14" name="TextBox 13">
+                <a:extLst>
+                  <a:ext uri="{FF2B5EF4-FFF2-40B4-BE49-F238E27FC236}">
+                    <a16:creationId xmlns:a16="http://schemas.microsoft.com/office/drawing/2014/main" id="{670332F2-C1A2-F49E-03C1-6B3D2F809A0A}"/>
+                  </a:ext>
+                </a:extLst>
+              </p:cNvPr>
+              <p:cNvSpPr txBox="1"/>
+              <p:nvPr/>
+            </p:nvSpPr>
+            <p:spPr>
+              <a:xfrm>
+                <a:off x="708077" y="417209"/>
+                <a:ext cx="432534" cy="3139321"/>
+              </a:xfrm>
+              <a:prstGeom prst="rect">
+                <a:avLst/>
+              </a:prstGeom>
+              <a:noFill/>
+            </p:spPr>
+            <p:txBody>
+              <a:bodyPr wrap="square" rtlCol="0">
+                <a:spAutoFit/>
+              </a:bodyPr>
+              <a:lstStyle/>
+              <a:p>
+                <a:r>
+                  <a:rPr lang="en-GB" dirty="0">
+                    <a:solidFill>
+                      <a:schemeClr val="bg1"/>
+                    </a:solidFill>
+                  </a:rPr>
+                  <a:t>1</a:t>
+                </a:r>
+              </a:p>
+              <a:p>
+                <a:endParaRPr lang="en-GB" dirty="0">
+                  <a:solidFill>
+                    <a:schemeClr val="bg1"/>
+                  </a:solidFill>
+                </a:endParaRPr>
+              </a:p>
+              <a:p>
+                <a:r>
+                  <a:rPr lang="en-GB" dirty="0">
+                    <a:solidFill>
+                      <a:schemeClr val="bg1"/>
+                    </a:solidFill>
+                  </a:rPr>
+                  <a:t>2</a:t>
+                </a:r>
+              </a:p>
+              <a:p>
+                <a:endParaRPr lang="en-GB" dirty="0">
+                  <a:solidFill>
+                    <a:schemeClr val="bg1"/>
+                  </a:solidFill>
+                </a:endParaRPr>
+              </a:p>
+              <a:p>
+                <a:r>
+                  <a:rPr lang="en-GB" dirty="0">
+                    <a:solidFill>
+                      <a:schemeClr val="bg1"/>
+                    </a:solidFill>
+                  </a:rPr>
+                  <a:t>3</a:t>
+                </a:r>
+              </a:p>
+              <a:p>
+                <a:endParaRPr lang="en-GB" dirty="0">
+                  <a:solidFill>
+                    <a:schemeClr val="bg1"/>
+                  </a:solidFill>
+                </a:endParaRPr>
+              </a:p>
+              <a:p>
+                <a:r>
+                  <a:rPr lang="en-GB" dirty="0">
+                    <a:solidFill>
+                      <a:schemeClr val="bg1"/>
+                    </a:solidFill>
+                  </a:rPr>
+                  <a:t>4</a:t>
+                </a:r>
+              </a:p>
+              <a:p>
+                <a:endParaRPr lang="en-GB" dirty="0">
+                  <a:solidFill>
+                    <a:schemeClr val="bg1"/>
+                  </a:solidFill>
+                </a:endParaRPr>
+              </a:p>
+              <a:p>
+                <a:r>
+                  <a:rPr lang="en-GB" dirty="0">
+                    <a:solidFill>
+                      <a:schemeClr val="bg1"/>
+                    </a:solidFill>
+                  </a:rPr>
+                  <a:t>5</a:t>
+                </a:r>
+              </a:p>
+              <a:p>
+                <a:endParaRPr lang="en-GB" dirty="0">
+                  <a:solidFill>
+                    <a:schemeClr val="bg1"/>
+                  </a:solidFill>
+                </a:endParaRPr>
+              </a:p>
+              <a:p>
+                <a:r>
+                  <a:rPr lang="en-GB" dirty="0">
+                    <a:solidFill>
+                      <a:schemeClr val="bg1"/>
+                    </a:solidFill>
+                  </a:rPr>
+                  <a:t>6</a:t>
+                </a:r>
+              </a:p>
+            </p:txBody>
+          </p:sp>
+        </p:grpSp>
+        <p:sp>
+          <p:nvSpPr>
+            <p:cNvPr id="11" name="Rectangle: Rounded Corners 10">
+              <a:extLst>
+                <a:ext uri="{FF2B5EF4-FFF2-40B4-BE49-F238E27FC236}">
+                  <a16:creationId xmlns:a16="http://schemas.microsoft.com/office/drawing/2014/main" id="{0D135425-53D2-86A7-C0FA-470B65377D09}"/>
+                </a:ext>
+              </a:extLst>
+            </p:cNvPr>
+            <p:cNvSpPr/>
+            <p:nvPr/>
+          </p:nvSpPr>
+          <p:spPr>
+            <a:xfrm>
+              <a:off x="1491894" y="679381"/>
+              <a:ext cx="2371446" cy="291471"/>
+            </a:xfrm>
+            <a:prstGeom prst="roundRect">
+              <a:avLst/>
+            </a:prstGeom>
+          </p:spPr>
+          <p:style>
+            <a:lnRef idx="2">
+              <a:schemeClr val="accent1">
+                <a:shade val="15000"/>
+              </a:schemeClr>
+            </a:lnRef>
+            <a:fillRef idx="1">
+              <a:schemeClr val="accent1"/>
+            </a:fillRef>
+            <a:effectRef idx="0">
+              <a:schemeClr val="accent1"/>
+            </a:effectRef>
+            <a:fontRef idx="minor">
+              <a:schemeClr val="lt1"/>
+            </a:fontRef>
+          </p:style>
+          <p:txBody>
+            <a:bodyPr rtlCol="0" anchor="ctr"/>
+            <a:lstStyle/>
+            <a:p>
+              <a:pPr algn="ctr"/>
+              <a:r>
+                <a:rPr lang="en-GB" dirty="0"/>
+                <a:t>Watchdog Task</a:t>
+              </a:r>
+            </a:p>
+          </p:txBody>
+        </p:sp>
+        <p:sp>
+          <p:nvSpPr>
+            <p:cNvPr id="12" name="Rectangle: Rounded Corners 11">
+              <a:extLst>
+                <a:ext uri="{FF2B5EF4-FFF2-40B4-BE49-F238E27FC236}">
+                  <a16:creationId xmlns:a16="http://schemas.microsoft.com/office/drawing/2014/main" id="{147AA404-F460-C394-E8A5-0DAD6B66F616}"/>
+                </a:ext>
+              </a:extLst>
+            </p:cNvPr>
+            <p:cNvSpPr/>
+            <p:nvPr/>
+          </p:nvSpPr>
+          <p:spPr>
+            <a:xfrm>
+              <a:off x="1491894" y="1243848"/>
+              <a:ext cx="2371446" cy="291471"/>
+            </a:xfrm>
+            <a:prstGeom prst="roundRect">
+              <a:avLst/>
+            </a:prstGeom>
+          </p:spPr>
+          <p:style>
+            <a:lnRef idx="2">
+              <a:schemeClr val="accent1">
+                <a:shade val="15000"/>
+              </a:schemeClr>
+            </a:lnRef>
+            <a:fillRef idx="1">
+              <a:schemeClr val="accent1"/>
+            </a:fillRef>
+            <a:effectRef idx="0">
+              <a:schemeClr val="accent1"/>
+            </a:effectRef>
+            <a:fontRef idx="minor">
+              <a:schemeClr val="lt1"/>
+            </a:fontRef>
+          </p:style>
+          <p:txBody>
+            <a:bodyPr rtlCol="0" anchor="ctr"/>
+            <a:lstStyle/>
+            <a:p>
+              <a:pPr algn="ctr"/>
+              <a:r>
+                <a:rPr lang="en-GB" dirty="0"/>
+                <a:t>Cyclic Task</a:t>
+              </a:r>
+            </a:p>
+          </p:txBody>
+        </p:sp>
+      </p:grpSp>
+      <p:sp>
+        <p:nvSpPr>
+          <p:cNvPr id="17" name="Rectangle: Rounded Corners 16">
+            <a:extLst>
+              <a:ext uri="{FF2B5EF4-FFF2-40B4-BE49-F238E27FC236}">
+                <a16:creationId xmlns:a16="http://schemas.microsoft.com/office/drawing/2014/main" id="{DDDF3FAD-7FC7-9394-28EE-B529FD1D06ED}"/>
+              </a:ext>
+            </a:extLst>
+          </p:cNvPr>
+          <p:cNvSpPr/>
+          <p:nvPr/>
+        </p:nvSpPr>
+        <p:spPr>
+          <a:xfrm>
+            <a:off x="1807884" y="1864317"/>
+            <a:ext cx="2371446" cy="291471"/>
+          </a:xfrm>
+          <a:prstGeom prst="roundRect">
+            <a:avLst/>
+          </a:prstGeom>
+        </p:spPr>
+        <p:style>
+          <a:lnRef idx="2">
+            <a:schemeClr val="accent1">
+              <a:shade val="15000"/>
+            </a:schemeClr>
+          </a:lnRef>
+          <a:fillRef idx="1">
+            <a:schemeClr val="accent1"/>
+          </a:fillRef>
+          <a:effectRef idx="0">
+            <a:schemeClr val="accent1"/>
+          </a:effectRef>
+          <a:fontRef idx="minor">
+            <a:schemeClr val="lt1"/>
+          </a:fontRef>
+        </p:style>
+        <p:txBody>
+          <a:bodyPr rtlCol="0" anchor="ctr"/>
+          <a:lstStyle/>
+          <a:p>
+            <a:pPr algn="ctr"/>
+            <a:r>
+              <a:rPr lang="en-GB" dirty="0"/>
+              <a:t>UDP Polling Task</a:t>
+            </a:r>
+          </a:p>
+        </p:txBody>
+      </p:sp>
+      <p:sp>
+        <p:nvSpPr>
+          <p:cNvPr id="18" name="Rectangle: Rounded Corners 17">
+            <a:extLst>
+              <a:ext uri="{FF2B5EF4-FFF2-40B4-BE49-F238E27FC236}">
+                <a16:creationId xmlns:a16="http://schemas.microsoft.com/office/drawing/2014/main" id="{D019F5CF-7BA9-CFFE-939B-82B8BB6E7903}"/>
+              </a:ext>
+            </a:extLst>
+          </p:cNvPr>
+          <p:cNvSpPr/>
+          <p:nvPr/>
+        </p:nvSpPr>
+        <p:spPr>
+          <a:xfrm>
+            <a:off x="7678382" y="3542442"/>
+            <a:ext cx="2371446" cy="291471"/>
+          </a:xfrm>
+          <a:prstGeom prst="roundRect">
+            <a:avLst/>
+          </a:prstGeom>
+        </p:spPr>
+        <p:style>
+          <a:lnRef idx="2">
+            <a:schemeClr val="accent1">
+              <a:shade val="15000"/>
+            </a:schemeClr>
+          </a:lnRef>
+          <a:fillRef idx="1">
+            <a:schemeClr val="accent1"/>
+          </a:fillRef>
+          <a:effectRef idx="0">
+            <a:schemeClr val="accent1"/>
+          </a:effectRef>
+          <a:fontRef idx="minor">
+            <a:schemeClr val="lt1"/>
+          </a:fontRef>
+        </p:style>
+        <p:txBody>
+          <a:bodyPr rtlCol="0" anchor="ctr"/>
+          <a:lstStyle/>
+          <a:p>
+            <a:pPr algn="ctr"/>
+            <a:r>
+              <a:rPr lang="en-GB" dirty="0"/>
+              <a:t>Idle Task</a:t>
+            </a:r>
+          </a:p>
+        </p:txBody>
+      </p:sp>
+      <p:sp>
+        <p:nvSpPr>
+          <p:cNvPr id="21" name="Rectangle: Rounded Corners 20">
+            <a:extLst>
+              <a:ext uri="{FF2B5EF4-FFF2-40B4-BE49-F238E27FC236}">
+                <a16:creationId xmlns:a16="http://schemas.microsoft.com/office/drawing/2014/main" id="{2A21038C-5BD9-FB7E-BC8E-DE11A4C1F7B8}"/>
+              </a:ext>
+            </a:extLst>
+          </p:cNvPr>
+          <p:cNvSpPr/>
+          <p:nvPr/>
+        </p:nvSpPr>
+        <p:spPr>
+          <a:xfrm>
+            <a:off x="1807884" y="3528593"/>
+            <a:ext cx="2371446" cy="291471"/>
+          </a:xfrm>
+          <a:prstGeom prst="roundRect">
+            <a:avLst/>
+          </a:prstGeom>
+        </p:spPr>
+        <p:style>
+          <a:lnRef idx="2">
+            <a:schemeClr val="accent1">
+              <a:shade val="15000"/>
+            </a:schemeClr>
+          </a:lnRef>
+          <a:fillRef idx="1">
+            <a:schemeClr val="accent1"/>
+          </a:fillRef>
+          <a:effectRef idx="0">
+            <a:schemeClr val="accent1"/>
+          </a:effectRef>
+          <a:fontRef idx="minor">
+            <a:schemeClr val="lt1"/>
+          </a:fontRef>
+        </p:style>
+        <p:txBody>
+          <a:bodyPr rtlCol="0" anchor="ctr"/>
+          <a:lstStyle/>
+          <a:p>
+            <a:pPr algn="ctr"/>
+            <a:r>
+              <a:rPr lang="en-GB" dirty="0"/>
+              <a:t>Idle Task</a:t>
+            </a:r>
+          </a:p>
+        </p:txBody>
+      </p:sp>
+    </p:spTree>
+    <p:extLst>
+      <p:ext uri="{BB962C8B-B14F-4D97-AF65-F5344CB8AC3E}">
+        <p14:creationId xmlns:p14="http://schemas.microsoft.com/office/powerpoint/2010/main" val="4042595297"/>
+      </p:ext>
+    </p:extLst>
+  </p:cSld>
+  <p:clrMapOvr>
+    <a:masterClrMapping/>
+  </p:clrMapOvr>
+</p:sld>
+</file>
+
 <file path=ppt/theme/theme1.xml><?xml version="1.0" encoding="utf-8"?>
 <a:theme xmlns:a="http://schemas.openxmlformats.org/drawingml/2006/main" name="Office Theme">
   <a:themeElements>

</xml_diff>

<commit_message>
Updated internal function behavior and data management
</commit_message>
<xml_diff>
--- a/Documents/Diagram.pptx
+++ b/Documents/Diagram.pptx
@@ -263,7 +263,7 @@
           <a:p>
             <a:fld id="{F8DC1015-422A-4414-B370-40667003ACCC}" type="datetimeFigureOut">
               <a:rPr lang="en-GB" smtClean="0"/>
-              <a:t>11/02/2025</a:t>
+              <a:t>24/02/2025</a:t>
             </a:fld>
             <a:endParaRPr lang="en-GB"/>
           </a:p>
@@ -463,7 +463,7 @@
           <a:p>
             <a:fld id="{F8DC1015-422A-4414-B370-40667003ACCC}" type="datetimeFigureOut">
               <a:rPr lang="en-GB" smtClean="0"/>
-              <a:t>11/02/2025</a:t>
+              <a:t>24/02/2025</a:t>
             </a:fld>
             <a:endParaRPr lang="en-GB"/>
           </a:p>
@@ -673,7 +673,7 @@
           <a:p>
             <a:fld id="{F8DC1015-422A-4414-B370-40667003ACCC}" type="datetimeFigureOut">
               <a:rPr lang="en-GB" smtClean="0"/>
-              <a:t>11/02/2025</a:t>
+              <a:t>24/02/2025</a:t>
             </a:fld>
             <a:endParaRPr lang="en-GB"/>
           </a:p>
@@ -873,7 +873,7 @@
           <a:p>
             <a:fld id="{F8DC1015-422A-4414-B370-40667003ACCC}" type="datetimeFigureOut">
               <a:rPr lang="en-GB" smtClean="0"/>
-              <a:t>11/02/2025</a:t>
+              <a:t>24/02/2025</a:t>
             </a:fld>
             <a:endParaRPr lang="en-GB"/>
           </a:p>
@@ -1149,7 +1149,7 @@
           <a:p>
             <a:fld id="{F8DC1015-422A-4414-B370-40667003ACCC}" type="datetimeFigureOut">
               <a:rPr lang="en-GB" smtClean="0"/>
-              <a:t>11/02/2025</a:t>
+              <a:t>24/02/2025</a:t>
             </a:fld>
             <a:endParaRPr lang="en-GB"/>
           </a:p>
@@ -1417,7 +1417,7 @@
           <a:p>
             <a:fld id="{F8DC1015-422A-4414-B370-40667003ACCC}" type="datetimeFigureOut">
               <a:rPr lang="en-GB" smtClean="0"/>
-              <a:t>11/02/2025</a:t>
+              <a:t>24/02/2025</a:t>
             </a:fld>
             <a:endParaRPr lang="en-GB"/>
           </a:p>
@@ -1832,7 +1832,7 @@
           <a:p>
             <a:fld id="{F8DC1015-422A-4414-B370-40667003ACCC}" type="datetimeFigureOut">
               <a:rPr lang="en-GB" smtClean="0"/>
-              <a:t>11/02/2025</a:t>
+              <a:t>24/02/2025</a:t>
             </a:fld>
             <a:endParaRPr lang="en-GB"/>
           </a:p>
@@ -1974,7 +1974,7 @@
           <a:p>
             <a:fld id="{F8DC1015-422A-4414-B370-40667003ACCC}" type="datetimeFigureOut">
               <a:rPr lang="en-GB" smtClean="0"/>
-              <a:t>11/02/2025</a:t>
+              <a:t>24/02/2025</a:t>
             </a:fld>
             <a:endParaRPr lang="en-GB"/>
           </a:p>
@@ -2087,7 +2087,7 @@
           <a:p>
             <a:fld id="{F8DC1015-422A-4414-B370-40667003ACCC}" type="datetimeFigureOut">
               <a:rPr lang="en-GB" smtClean="0"/>
-              <a:t>11/02/2025</a:t>
+              <a:t>24/02/2025</a:t>
             </a:fld>
             <a:endParaRPr lang="en-GB"/>
           </a:p>
@@ -2400,7 +2400,7 @@
           <a:p>
             <a:fld id="{F8DC1015-422A-4414-B370-40667003ACCC}" type="datetimeFigureOut">
               <a:rPr lang="en-GB" smtClean="0"/>
-              <a:t>11/02/2025</a:t>
+              <a:t>24/02/2025</a:t>
             </a:fld>
             <a:endParaRPr lang="en-GB"/>
           </a:p>
@@ -2689,7 +2689,7 @@
           <a:p>
             <a:fld id="{F8DC1015-422A-4414-B370-40667003ACCC}" type="datetimeFigureOut">
               <a:rPr lang="en-GB" smtClean="0"/>
-              <a:t>11/02/2025</a:t>
+              <a:t>24/02/2025</a:t>
             </a:fld>
             <a:endParaRPr lang="en-GB"/>
           </a:p>
@@ -2932,7 +2932,7 @@
           <a:p>
             <a:fld id="{F8DC1015-422A-4414-B370-40667003ACCC}" type="datetimeFigureOut">
               <a:rPr lang="en-GB" smtClean="0"/>
-              <a:t>11/02/2025</a:t>
+              <a:t>24/02/2025</a:t>
             </a:fld>
             <a:endParaRPr lang="en-GB"/>
           </a:p>
@@ -5153,12 +5153,107 @@
           <a:chExt cx="0" cy="0"/>
         </a:xfrm>
       </p:grpSpPr>
+      <p:sp>
+        <p:nvSpPr>
+          <p:cNvPr id="4" name="Rectangle: Rounded Corners 3">
+            <a:extLst>
+              <a:ext uri="{FF2B5EF4-FFF2-40B4-BE49-F238E27FC236}">
+                <a16:creationId xmlns:a16="http://schemas.microsoft.com/office/drawing/2014/main" id="{423C17CE-6DE9-A800-6210-3820FBF42EE3}"/>
+              </a:ext>
+            </a:extLst>
+          </p:cNvPr>
+          <p:cNvSpPr/>
+          <p:nvPr/>
+        </p:nvSpPr>
+        <p:spPr>
+          <a:xfrm>
+            <a:off x="688073" y="257694"/>
+            <a:ext cx="4855648" cy="6279990"/>
+          </a:xfrm>
+          <a:prstGeom prst="roundRect">
+            <a:avLst>
+              <a:gd name="adj" fmla="val 11992"/>
+            </a:avLst>
+          </a:prstGeom>
+          <a:solidFill>
+            <a:schemeClr val="accent6"/>
+          </a:solidFill>
+        </p:spPr>
+        <p:style>
+          <a:lnRef idx="2">
+            <a:schemeClr val="accent1">
+              <a:shade val="15000"/>
+            </a:schemeClr>
+          </a:lnRef>
+          <a:fillRef idx="1">
+            <a:schemeClr val="accent1"/>
+          </a:fillRef>
+          <a:effectRef idx="0">
+            <a:schemeClr val="accent1"/>
+          </a:effectRef>
+          <a:fontRef idx="minor">
+            <a:schemeClr val="lt1"/>
+          </a:fontRef>
+        </p:style>
+        <p:txBody>
+          <a:bodyPr rtlCol="0" anchor="ctr"/>
+          <a:lstStyle/>
+          <a:p>
+            <a:pPr algn="ctr"/>
+            <a:endParaRPr lang="en-GB" dirty="0">
+              <a:solidFill>
+                <a:schemeClr val="accent6"/>
+              </a:solidFill>
+            </a:endParaRPr>
+          </a:p>
+        </p:txBody>
+      </p:sp>
+      <p:sp>
+        <p:nvSpPr>
+          <p:cNvPr id="6" name="TextBox 5">
+            <a:extLst>
+              <a:ext uri="{FF2B5EF4-FFF2-40B4-BE49-F238E27FC236}">
+                <a16:creationId xmlns:a16="http://schemas.microsoft.com/office/drawing/2014/main" id="{995F052F-FD61-213A-16B6-B77D5908B875}"/>
+              </a:ext>
+            </a:extLst>
+          </p:cNvPr>
+          <p:cNvSpPr txBox="1"/>
+          <p:nvPr/>
+        </p:nvSpPr>
+        <p:spPr>
+          <a:xfrm>
+            <a:off x="1710315" y="320316"/>
+            <a:ext cx="2811165" cy="369332"/>
+          </a:xfrm>
+          <a:prstGeom prst="rect">
+            <a:avLst/>
+          </a:prstGeom>
+          <a:noFill/>
+        </p:spPr>
+        <p:txBody>
+          <a:bodyPr wrap="square" rtlCol="0">
+            <a:spAutoFit/>
+          </a:bodyPr>
+          <a:lstStyle/>
+          <a:p>
+            <a:pPr algn="ctr"/>
+            <a:r>
+              <a:rPr lang="en-GB" dirty="0">
+                <a:solidFill>
+                  <a:schemeClr val="bg1"/>
+                </a:solidFill>
+              </a:rPr>
+              <a:t>Core 0</a:t>
+            </a:r>
+          </a:p>
+        </p:txBody>
+      </p:sp>
       <p:grpSp>
         <p:nvGrpSpPr>
-          <p:cNvPr id="40" name="Group 39">
-            <a:extLst>
-              <a:ext uri="{FF2B5EF4-FFF2-40B4-BE49-F238E27FC236}">
-                <a16:creationId xmlns:a16="http://schemas.microsoft.com/office/drawing/2014/main" id="{E19329DD-6674-DDE0-04C1-48951FDEA09F}"/>
+          <p:cNvPr id="25" name="Group 24">
+            <a:extLst>
+              <a:ext uri="{FF2B5EF4-FFF2-40B4-BE49-F238E27FC236}">
+                <a16:creationId xmlns:a16="http://schemas.microsoft.com/office/drawing/2014/main" id="{4A7B92ED-9CD5-2BE4-3758-AEAEB3925E41}"/>
               </a:ext>
             </a:extLst>
           </p:cNvPr>
@@ -5167,327 +5262,18 @@
         </p:nvGrpSpPr>
         <p:grpSpPr>
           <a:xfrm>
-            <a:off x="688073" y="257694"/>
-            <a:ext cx="4855648" cy="3912108"/>
-            <a:chOff x="379475" y="195072"/>
-            <a:chExt cx="4855648" cy="3912108"/>
+            <a:off x="1113452" y="664496"/>
+            <a:ext cx="439926" cy="5410848"/>
+            <a:chOff x="640259" y="384855"/>
+            <a:chExt cx="439926" cy="3435497"/>
           </a:xfrm>
         </p:grpSpPr>
-        <p:grpSp>
-          <p:nvGrpSpPr>
-            <p:cNvPr id="22" name="Group 21">
+        <p:sp>
+          <p:nvSpPr>
+            <p:cNvPr id="23" name="Rectangle: Rounded Corners 22">
               <a:extLst>
                 <a:ext uri="{FF2B5EF4-FFF2-40B4-BE49-F238E27FC236}">
-                  <a16:creationId xmlns:a16="http://schemas.microsoft.com/office/drawing/2014/main" id="{45CC4739-B309-B462-BC6A-31DC0E2E7B61}"/>
-                </a:ext>
-              </a:extLst>
-            </p:cNvPr>
-            <p:cNvGrpSpPr/>
-            <p:nvPr/>
-          </p:nvGrpSpPr>
-          <p:grpSpPr>
-            <a:xfrm>
-              <a:off x="379475" y="195072"/>
-              <a:ext cx="4855648" cy="3912108"/>
-              <a:chOff x="67055" y="195072"/>
-              <a:chExt cx="3822192" cy="2340864"/>
-            </a:xfrm>
-          </p:grpSpPr>
-          <p:sp>
-            <p:nvSpPr>
-              <p:cNvPr id="4" name="Rectangle: Rounded Corners 3">
-                <a:extLst>
-                  <a:ext uri="{FF2B5EF4-FFF2-40B4-BE49-F238E27FC236}">
-                    <a16:creationId xmlns:a16="http://schemas.microsoft.com/office/drawing/2014/main" id="{423C17CE-6DE9-A800-6210-3820FBF42EE3}"/>
-                  </a:ext>
-                </a:extLst>
-              </p:cNvPr>
-              <p:cNvSpPr/>
-              <p:nvPr/>
-            </p:nvSpPr>
-            <p:spPr>
-              <a:xfrm>
-                <a:off x="67055" y="195072"/>
-                <a:ext cx="3822192" cy="2340864"/>
-              </a:xfrm>
-              <a:prstGeom prst="roundRect">
-                <a:avLst>
-                  <a:gd name="adj" fmla="val 11992"/>
-                </a:avLst>
-              </a:prstGeom>
-              <a:solidFill>
-                <a:schemeClr val="accent6"/>
-              </a:solidFill>
-            </p:spPr>
-            <p:style>
-              <a:lnRef idx="2">
-                <a:schemeClr val="accent1">
-                  <a:shade val="15000"/>
-                </a:schemeClr>
-              </a:lnRef>
-              <a:fillRef idx="1">
-                <a:schemeClr val="accent1"/>
-              </a:fillRef>
-              <a:effectRef idx="0">
-                <a:schemeClr val="accent1"/>
-              </a:effectRef>
-              <a:fontRef idx="minor">
-                <a:schemeClr val="lt1"/>
-              </a:fontRef>
-            </p:style>
-            <p:txBody>
-              <a:bodyPr rtlCol="0" anchor="ctr"/>
-              <a:lstStyle/>
-              <a:p>
-                <a:pPr algn="ctr"/>
-                <a:endParaRPr lang="en-GB" dirty="0">
-                  <a:solidFill>
-                    <a:schemeClr val="accent6"/>
-                  </a:solidFill>
-                </a:endParaRPr>
-              </a:p>
-            </p:txBody>
-          </p:sp>
-          <p:sp>
-            <p:nvSpPr>
-              <p:cNvPr id="6" name="TextBox 5">
-                <a:extLst>
-                  <a:ext uri="{FF2B5EF4-FFF2-40B4-BE49-F238E27FC236}">
-                    <a16:creationId xmlns:a16="http://schemas.microsoft.com/office/drawing/2014/main" id="{995F052F-FD61-213A-16B6-B77D5908B875}"/>
-                  </a:ext>
-                </a:extLst>
-              </p:cNvPr>
-              <p:cNvSpPr txBox="1"/>
-              <p:nvPr/>
-            </p:nvSpPr>
-            <p:spPr>
-              <a:xfrm>
-                <a:off x="871727" y="232543"/>
-                <a:ext cx="2212848" cy="220995"/>
-              </a:xfrm>
-              <a:prstGeom prst="rect">
-                <a:avLst/>
-              </a:prstGeom>
-              <a:noFill/>
-            </p:spPr>
-            <p:txBody>
-              <a:bodyPr wrap="square" rtlCol="0">
-                <a:spAutoFit/>
-              </a:bodyPr>
-              <a:lstStyle/>
-              <a:p>
-                <a:pPr algn="ctr"/>
-                <a:r>
-                  <a:rPr lang="en-GB" dirty="0">
-                    <a:solidFill>
-                      <a:schemeClr val="bg1"/>
-                    </a:solidFill>
-                  </a:rPr>
-                  <a:t>Core 0</a:t>
-                </a:r>
-              </a:p>
-            </p:txBody>
-          </p:sp>
-        </p:grpSp>
-        <p:grpSp>
-          <p:nvGrpSpPr>
-            <p:cNvPr id="25" name="Group 24">
-              <a:extLst>
-                <a:ext uri="{FF2B5EF4-FFF2-40B4-BE49-F238E27FC236}">
-                  <a16:creationId xmlns:a16="http://schemas.microsoft.com/office/drawing/2014/main" id="{4A7B92ED-9CD5-2BE4-3758-AEAEB3925E41}"/>
-                </a:ext>
-              </a:extLst>
-            </p:cNvPr>
-            <p:cNvGrpSpPr/>
-            <p:nvPr/>
-          </p:nvGrpSpPr>
-          <p:grpSpPr>
-            <a:xfrm>
-              <a:off x="804854" y="601875"/>
-              <a:ext cx="500352" cy="3409906"/>
-              <a:chOff x="640259" y="384855"/>
-              <a:chExt cx="500352" cy="3409906"/>
-            </a:xfrm>
-          </p:grpSpPr>
-          <p:sp>
-            <p:nvSpPr>
-              <p:cNvPr id="23" name="Rectangle: Rounded Corners 22">
-                <a:extLst>
-                  <a:ext uri="{FF2B5EF4-FFF2-40B4-BE49-F238E27FC236}">
-                    <a16:creationId xmlns:a16="http://schemas.microsoft.com/office/drawing/2014/main" id="{74D41D34-E578-AFCF-131E-78F70C3A1199}"/>
-                  </a:ext>
-                </a:extLst>
-              </p:cNvPr>
-              <p:cNvSpPr/>
-              <p:nvPr/>
-            </p:nvSpPr>
-            <p:spPr>
-              <a:xfrm>
-                <a:off x="640259" y="384855"/>
-                <a:ext cx="432534" cy="3409906"/>
-              </a:xfrm>
-              <a:prstGeom prst="roundRect">
-                <a:avLst>
-                  <a:gd name="adj" fmla="val 41331"/>
-                </a:avLst>
-              </a:prstGeom>
-            </p:spPr>
-            <p:style>
-              <a:lnRef idx="2">
-                <a:schemeClr val="accent1">
-                  <a:shade val="15000"/>
-                </a:schemeClr>
-              </a:lnRef>
-              <a:fillRef idx="1">
-                <a:schemeClr val="accent1"/>
-              </a:fillRef>
-              <a:effectRef idx="0">
-                <a:schemeClr val="accent1"/>
-              </a:effectRef>
-              <a:fontRef idx="minor">
-                <a:schemeClr val="lt1"/>
-              </a:fontRef>
-            </p:style>
-            <p:txBody>
-              <a:bodyPr rtlCol="0" anchor="ctr"/>
-              <a:lstStyle/>
-              <a:p>
-                <a:pPr algn="ctr"/>
-                <a:endParaRPr lang="en-GB"/>
-              </a:p>
-            </p:txBody>
-          </p:sp>
-          <p:sp>
-            <p:nvSpPr>
-              <p:cNvPr id="24" name="TextBox 23">
-                <a:extLst>
-                  <a:ext uri="{FF2B5EF4-FFF2-40B4-BE49-F238E27FC236}">
-                    <a16:creationId xmlns:a16="http://schemas.microsoft.com/office/drawing/2014/main" id="{55C91510-83AC-6F2C-959C-B3C511B96E55}"/>
-                  </a:ext>
-                </a:extLst>
-              </p:cNvPr>
-              <p:cNvSpPr txBox="1"/>
-              <p:nvPr/>
-            </p:nvSpPr>
-            <p:spPr>
-              <a:xfrm>
-                <a:off x="708077" y="417209"/>
-                <a:ext cx="432534" cy="3139321"/>
-              </a:xfrm>
-              <a:prstGeom prst="rect">
-                <a:avLst/>
-              </a:prstGeom>
-              <a:noFill/>
-            </p:spPr>
-            <p:txBody>
-              <a:bodyPr wrap="square" rtlCol="0">
-                <a:spAutoFit/>
-              </a:bodyPr>
-              <a:lstStyle/>
-              <a:p>
-                <a:r>
-                  <a:rPr lang="en-GB" dirty="0">
-                    <a:solidFill>
-                      <a:schemeClr val="bg1"/>
-                    </a:solidFill>
-                  </a:rPr>
-                  <a:t>1</a:t>
-                </a:r>
-              </a:p>
-              <a:p>
-                <a:endParaRPr lang="en-GB" dirty="0">
-                  <a:solidFill>
-                    <a:schemeClr val="bg1"/>
-                  </a:solidFill>
-                </a:endParaRPr>
-              </a:p>
-              <a:p>
-                <a:r>
-                  <a:rPr lang="en-GB" dirty="0">
-                    <a:solidFill>
-                      <a:schemeClr val="bg1"/>
-                    </a:solidFill>
-                  </a:rPr>
-                  <a:t>2</a:t>
-                </a:r>
-              </a:p>
-              <a:p>
-                <a:endParaRPr lang="en-GB" dirty="0">
-                  <a:solidFill>
-                    <a:schemeClr val="bg1"/>
-                  </a:solidFill>
-                </a:endParaRPr>
-              </a:p>
-              <a:p>
-                <a:r>
-                  <a:rPr lang="en-GB" dirty="0">
-                    <a:solidFill>
-                      <a:schemeClr val="bg1"/>
-                    </a:solidFill>
-                  </a:rPr>
-                  <a:t>3</a:t>
-                </a:r>
-              </a:p>
-              <a:p>
-                <a:endParaRPr lang="en-GB" dirty="0">
-                  <a:solidFill>
-                    <a:schemeClr val="bg1"/>
-                  </a:solidFill>
-                </a:endParaRPr>
-              </a:p>
-              <a:p>
-                <a:r>
-                  <a:rPr lang="en-GB" dirty="0">
-                    <a:solidFill>
-                      <a:schemeClr val="bg1"/>
-                    </a:solidFill>
-                  </a:rPr>
-                  <a:t>4</a:t>
-                </a:r>
-              </a:p>
-              <a:p>
-                <a:endParaRPr lang="en-GB" dirty="0">
-                  <a:solidFill>
-                    <a:schemeClr val="bg1"/>
-                  </a:solidFill>
-                </a:endParaRPr>
-              </a:p>
-              <a:p>
-                <a:r>
-                  <a:rPr lang="en-GB" dirty="0">
-                    <a:solidFill>
-                      <a:schemeClr val="bg1"/>
-                    </a:solidFill>
-                  </a:rPr>
-                  <a:t>5</a:t>
-                </a:r>
-              </a:p>
-              <a:p>
-                <a:endParaRPr lang="en-GB" dirty="0">
-                  <a:solidFill>
-                    <a:schemeClr val="bg1"/>
-                  </a:solidFill>
-                </a:endParaRPr>
-              </a:p>
-              <a:p>
-                <a:r>
-                  <a:rPr lang="en-GB" dirty="0">
-                    <a:solidFill>
-                      <a:schemeClr val="bg1"/>
-                    </a:solidFill>
-                  </a:rPr>
-                  <a:t>6</a:t>
-                </a:r>
-              </a:p>
-            </p:txBody>
-          </p:sp>
-        </p:grpSp>
-        <p:sp>
-          <p:nvSpPr>
-            <p:cNvPr id="26" name="Rectangle: Rounded Corners 25">
-              <a:extLst>
-                <a:ext uri="{FF2B5EF4-FFF2-40B4-BE49-F238E27FC236}">
-                  <a16:creationId xmlns:a16="http://schemas.microsoft.com/office/drawing/2014/main" id="{9B324752-A5BC-4E4D-44E1-54B8DF9A7457}"/>
+                  <a16:creationId xmlns:a16="http://schemas.microsoft.com/office/drawing/2014/main" id="{74D41D34-E578-AFCF-131E-78F70C3A1199}"/>
                 </a:ext>
               </a:extLst>
             </p:cNvPr>
@@ -5496,11 +5282,13 @@
           </p:nvSpPr>
           <p:spPr>
             <a:xfrm>
-              <a:off x="1491894" y="679381"/>
-              <a:ext cx="2371446" cy="291471"/>
+              <a:off x="640259" y="384855"/>
+              <a:ext cx="432534" cy="3409906"/>
             </a:xfrm>
             <a:prstGeom prst="roundRect">
-              <a:avLst/>
+              <a:avLst>
+                <a:gd name="adj" fmla="val 41331"/>
+              </a:avLst>
             </a:prstGeom>
           </p:spPr>
           <p:style>
@@ -5524,63 +5312,320 @@
             <a:lstStyle/>
             <a:p>
               <a:pPr algn="ctr"/>
-              <a:r>
-                <a:rPr lang="en-GB" dirty="0"/>
-                <a:t>ESP Now Task</a:t>
-              </a:r>
+              <a:endParaRPr lang="en-GB"/>
             </a:p>
           </p:txBody>
         </p:sp>
         <p:sp>
           <p:nvSpPr>
-            <p:cNvPr id="27" name="Rectangle: Rounded Corners 26">
+            <p:cNvPr id="24" name="TextBox 23">
               <a:extLst>
                 <a:ext uri="{FF2B5EF4-FFF2-40B4-BE49-F238E27FC236}">
-                  <a16:creationId xmlns:a16="http://schemas.microsoft.com/office/drawing/2014/main" id="{D7A8AE30-2343-6AE8-D6C4-54A437C83DC8}"/>
+                  <a16:creationId xmlns:a16="http://schemas.microsoft.com/office/drawing/2014/main" id="{55C91510-83AC-6F2C-959C-B3C511B96E55}"/>
                 </a:ext>
               </a:extLst>
             </p:cNvPr>
-            <p:cNvSpPr/>
+            <p:cNvSpPr txBox="1"/>
             <p:nvPr/>
           </p:nvSpPr>
           <p:spPr>
             <a:xfrm>
-              <a:off x="1491894" y="1243848"/>
-              <a:ext cx="2371446" cy="291471"/>
+              <a:off x="647651" y="420117"/>
+              <a:ext cx="432534" cy="3400235"/>
             </a:xfrm>
-            <a:prstGeom prst="roundRect">
+            <a:prstGeom prst="rect">
               <a:avLst/>
             </a:prstGeom>
+            <a:noFill/>
           </p:spPr>
-          <p:style>
-            <a:lnRef idx="2">
-              <a:schemeClr val="accent1">
-                <a:shade val="15000"/>
-              </a:schemeClr>
-            </a:lnRef>
-            <a:fillRef idx="1">
-              <a:schemeClr val="accent1"/>
-            </a:fillRef>
-            <a:effectRef idx="0">
-              <a:schemeClr val="accent1"/>
-            </a:effectRef>
-            <a:fontRef idx="minor">
-              <a:schemeClr val="lt1"/>
-            </a:fontRef>
-          </p:style>
           <p:txBody>
-            <a:bodyPr rtlCol="0" anchor="ctr"/>
+            <a:bodyPr wrap="square" rtlCol="0">
+              <a:spAutoFit/>
+            </a:bodyPr>
             <a:lstStyle/>
             <a:p>
               <a:pPr algn="ctr"/>
               <a:r>
-                <a:rPr lang="en-GB" dirty="0"/>
-                <a:t>UDP Processing Task</a:t>
+                <a:rPr lang="en-GB" dirty="0">
+                  <a:solidFill>
+                    <a:schemeClr val="bg1"/>
+                  </a:solidFill>
+                </a:rPr>
+                <a:t>1</a:t>
+              </a:r>
+            </a:p>
+            <a:p>
+              <a:pPr algn="ctr"/>
+              <a:endParaRPr lang="en-GB" dirty="0">
+                <a:solidFill>
+                  <a:schemeClr val="bg1"/>
+                </a:solidFill>
+              </a:endParaRPr>
+            </a:p>
+            <a:p>
+              <a:pPr algn="ctr"/>
+              <a:r>
+                <a:rPr lang="en-GB" dirty="0">
+                  <a:solidFill>
+                    <a:schemeClr val="bg1"/>
+                  </a:solidFill>
+                </a:rPr>
+                <a:t>2</a:t>
+              </a:r>
+            </a:p>
+            <a:p>
+              <a:pPr algn="ctr"/>
+              <a:endParaRPr lang="en-GB" dirty="0">
+                <a:solidFill>
+                  <a:schemeClr val="bg1"/>
+                </a:solidFill>
+              </a:endParaRPr>
+            </a:p>
+            <a:p>
+              <a:pPr algn="ctr"/>
+              <a:r>
+                <a:rPr lang="en-GB" dirty="0">
+                  <a:solidFill>
+                    <a:schemeClr val="bg1"/>
+                  </a:solidFill>
+                </a:rPr>
+                <a:t>3</a:t>
+              </a:r>
+            </a:p>
+            <a:p>
+              <a:pPr algn="ctr"/>
+              <a:endParaRPr lang="en-GB" dirty="0">
+                <a:solidFill>
+                  <a:schemeClr val="bg1"/>
+                </a:solidFill>
+              </a:endParaRPr>
+            </a:p>
+            <a:p>
+              <a:pPr algn="ctr"/>
+              <a:r>
+                <a:rPr lang="en-GB" dirty="0">
+                  <a:solidFill>
+                    <a:schemeClr val="bg1"/>
+                  </a:solidFill>
+                </a:rPr>
+                <a:t>4</a:t>
+              </a:r>
+            </a:p>
+            <a:p>
+              <a:pPr algn="ctr"/>
+              <a:endParaRPr lang="en-GB" dirty="0">
+                <a:solidFill>
+                  <a:schemeClr val="bg1"/>
+                </a:solidFill>
+              </a:endParaRPr>
+            </a:p>
+            <a:p>
+              <a:pPr algn="ctr"/>
+              <a:r>
+                <a:rPr lang="en-GB" dirty="0">
+                  <a:solidFill>
+                    <a:schemeClr val="bg1"/>
+                  </a:solidFill>
+                </a:rPr>
+                <a:t>5</a:t>
+              </a:r>
+            </a:p>
+            <a:p>
+              <a:pPr algn="ctr"/>
+              <a:endParaRPr lang="en-GB" dirty="0">
+                <a:solidFill>
+                  <a:schemeClr val="bg1"/>
+                </a:solidFill>
+              </a:endParaRPr>
+            </a:p>
+            <a:p>
+              <a:pPr algn="ctr"/>
+              <a:r>
+                <a:rPr lang="en-GB" dirty="0">
+                  <a:solidFill>
+                    <a:schemeClr val="bg1"/>
+                  </a:solidFill>
+                </a:rPr>
+                <a:t>6</a:t>
+              </a:r>
+            </a:p>
+            <a:p>
+              <a:pPr algn="ctr"/>
+              <a:endParaRPr lang="en-GB" dirty="0">
+                <a:solidFill>
+                  <a:schemeClr val="bg1"/>
+                </a:solidFill>
+              </a:endParaRPr>
+            </a:p>
+            <a:p>
+              <a:pPr algn="ctr"/>
+              <a:r>
+                <a:rPr lang="en-GB" dirty="0">
+                  <a:solidFill>
+                    <a:schemeClr val="bg1"/>
+                  </a:solidFill>
+                </a:rPr>
+                <a:t>7</a:t>
+              </a:r>
+            </a:p>
+            <a:p>
+              <a:pPr algn="ctr"/>
+              <a:endParaRPr lang="en-GB" dirty="0">
+                <a:solidFill>
+                  <a:schemeClr val="bg1"/>
+                </a:solidFill>
+              </a:endParaRPr>
+            </a:p>
+            <a:p>
+              <a:pPr algn="ctr"/>
+              <a:r>
+                <a:rPr lang="en-GB" dirty="0">
+                  <a:solidFill>
+                    <a:schemeClr val="bg1"/>
+                  </a:solidFill>
+                </a:rPr>
+                <a:t>8</a:t>
+              </a:r>
+            </a:p>
+            <a:p>
+              <a:pPr algn="ctr"/>
+              <a:endParaRPr lang="en-GB" dirty="0">
+                <a:solidFill>
+                  <a:schemeClr val="bg1"/>
+                </a:solidFill>
+              </a:endParaRPr>
+            </a:p>
+            <a:p>
+              <a:pPr algn="ctr"/>
+              <a:r>
+                <a:rPr lang="en-GB" dirty="0">
+                  <a:solidFill>
+                    <a:schemeClr val="bg1"/>
+                  </a:solidFill>
+                </a:rPr>
+                <a:t>9</a:t>
+              </a:r>
+            </a:p>
+            <a:p>
+              <a:pPr algn="ctr"/>
+              <a:endParaRPr lang="en-GB" dirty="0">
+                <a:solidFill>
+                  <a:schemeClr val="bg1"/>
+                </a:solidFill>
+              </a:endParaRPr>
+            </a:p>
+            <a:p>
+              <a:pPr algn="ctr"/>
+              <a:r>
+                <a:rPr lang="en-GB" dirty="0">
+                  <a:solidFill>
+                    <a:schemeClr val="bg1"/>
+                  </a:solidFill>
+                </a:rPr>
+                <a:t>10</a:t>
               </a:r>
             </a:p>
           </p:txBody>
         </p:sp>
       </p:grpSp>
+      <p:sp>
+        <p:nvSpPr>
+          <p:cNvPr id="26" name="Rectangle: Rounded Corners 25">
+            <a:extLst>
+              <a:ext uri="{FF2B5EF4-FFF2-40B4-BE49-F238E27FC236}">
+                <a16:creationId xmlns:a16="http://schemas.microsoft.com/office/drawing/2014/main" id="{9B324752-A5BC-4E4D-44E1-54B8DF9A7457}"/>
+              </a:ext>
+            </a:extLst>
+          </p:cNvPr>
+          <p:cNvSpPr/>
+          <p:nvPr/>
+        </p:nvSpPr>
+        <p:spPr>
+          <a:xfrm>
+            <a:off x="1807884" y="734048"/>
+            <a:ext cx="2371446" cy="291471"/>
+          </a:xfrm>
+          <a:prstGeom prst="roundRect">
+            <a:avLst/>
+          </a:prstGeom>
+        </p:spPr>
+        <p:style>
+          <a:lnRef idx="2">
+            <a:schemeClr val="accent1">
+              <a:shade val="15000"/>
+            </a:schemeClr>
+          </a:lnRef>
+          <a:fillRef idx="1">
+            <a:schemeClr val="accent1"/>
+          </a:fillRef>
+          <a:effectRef idx="0">
+            <a:schemeClr val="accent1"/>
+          </a:effectRef>
+          <a:fontRef idx="minor">
+            <a:schemeClr val="lt1"/>
+          </a:fontRef>
+        </p:style>
+        <p:txBody>
+          <a:bodyPr rtlCol="0" anchor="ctr"/>
+          <a:lstStyle/>
+          <a:p>
+            <a:pPr algn="ctr"/>
+            <a:r>
+              <a:rPr lang="en-GB" dirty="0"/>
+              <a:t>ESP Now Task</a:t>
+            </a:r>
+          </a:p>
+        </p:txBody>
+      </p:sp>
+      <p:sp>
+        <p:nvSpPr>
+          <p:cNvPr id="27" name="Rectangle: Rounded Corners 26">
+            <a:extLst>
+              <a:ext uri="{FF2B5EF4-FFF2-40B4-BE49-F238E27FC236}">
+                <a16:creationId xmlns:a16="http://schemas.microsoft.com/office/drawing/2014/main" id="{D7A8AE30-2343-6AE8-D6C4-54A437C83DC8}"/>
+              </a:ext>
+            </a:extLst>
+          </p:cNvPr>
+          <p:cNvSpPr/>
+          <p:nvPr/>
+        </p:nvSpPr>
+        <p:spPr>
+          <a:xfrm>
+            <a:off x="1800492" y="1286004"/>
+            <a:ext cx="2371446" cy="291471"/>
+          </a:xfrm>
+          <a:prstGeom prst="roundRect">
+            <a:avLst/>
+          </a:prstGeom>
+        </p:spPr>
+        <p:style>
+          <a:lnRef idx="2">
+            <a:schemeClr val="accent1">
+              <a:shade val="15000"/>
+            </a:schemeClr>
+          </a:lnRef>
+          <a:fillRef idx="1">
+            <a:schemeClr val="accent1"/>
+          </a:fillRef>
+          <a:effectRef idx="0">
+            <a:schemeClr val="accent1"/>
+          </a:effectRef>
+          <a:fontRef idx="minor">
+            <a:schemeClr val="lt1"/>
+          </a:fontRef>
+        </p:style>
+        <p:txBody>
+          <a:bodyPr rtlCol="0" anchor="ctr"/>
+          <a:lstStyle/>
+          <a:p>
+            <a:pPr algn="ctr"/>
+            <a:r>
+              <a:rPr lang="en-GB" dirty="0"/>
+              <a:t>UDP Processing Task</a:t>
+            </a:r>
+          </a:p>
+        </p:txBody>
+      </p:sp>
       <p:grpSp>
         <p:nvGrpSpPr>
           <p:cNvPr id="2" name="Group 1">
@@ -6023,7 +6068,7 @@
         </p:nvSpPr>
         <p:spPr>
           <a:xfrm>
-            <a:off x="1807884" y="1864317"/>
+            <a:off x="1710315" y="5176469"/>
             <a:ext cx="2371446" cy="291471"/>
           </a:xfrm>
           <a:prstGeom prst="roundRect">
@@ -6121,7 +6166,7 @@
         </p:nvSpPr>
         <p:spPr>
           <a:xfrm>
-            <a:off x="1807884" y="3528593"/>
+            <a:off x="1710315" y="5728425"/>
             <a:ext cx="2371446" cy="291471"/>
           </a:xfrm>
           <a:prstGeom prst="roundRect">
@@ -6152,6 +6197,55 @@
             <a:r>
               <a:rPr lang="en-GB" dirty="0"/>
               <a:t>Idle Task</a:t>
+            </a:r>
+          </a:p>
+        </p:txBody>
+      </p:sp>
+      <p:sp>
+        <p:nvSpPr>
+          <p:cNvPr id="5" name="Rectangle: Rounded Corners 4">
+            <a:extLst>
+              <a:ext uri="{FF2B5EF4-FFF2-40B4-BE49-F238E27FC236}">
+                <a16:creationId xmlns:a16="http://schemas.microsoft.com/office/drawing/2014/main" id="{B7321415-3AB7-4AB8-705A-351F46273ECD}"/>
+              </a:ext>
+            </a:extLst>
+          </p:cNvPr>
+          <p:cNvSpPr/>
+          <p:nvPr/>
+        </p:nvSpPr>
+        <p:spPr>
+          <a:xfrm>
+            <a:off x="1800492" y="1837960"/>
+            <a:ext cx="2371446" cy="291471"/>
+          </a:xfrm>
+          <a:prstGeom prst="roundRect">
+            <a:avLst/>
+          </a:prstGeom>
+        </p:spPr>
+        <p:style>
+          <a:lnRef idx="2">
+            <a:schemeClr val="accent1">
+              <a:shade val="15000"/>
+            </a:schemeClr>
+          </a:lnRef>
+          <a:fillRef idx="1">
+            <a:schemeClr val="accent1"/>
+          </a:fillRef>
+          <a:effectRef idx="0">
+            <a:schemeClr val="accent1"/>
+          </a:effectRef>
+          <a:fontRef idx="minor">
+            <a:schemeClr val="lt1"/>
+          </a:fontRef>
+        </p:style>
+        <p:txBody>
+          <a:bodyPr rtlCol="0" anchor="ctr"/>
+          <a:lstStyle/>
+          <a:p>
+            <a:pPr algn="ctr"/>
+            <a:r>
+              <a:rPr lang="en-GB" dirty="0"/>
+              <a:t>UDP System Task</a:t>
             </a:r>
           </a:p>
         </p:txBody>

</xml_diff>